<commit_message>
Final changes to report.
</commit_message>
<xml_diff>
--- a/Presentation/Final-Project_draft_v0.1.pptx
+++ b/Presentation/Final-Project_draft_v0.1.pptx
@@ -10,12 +10,11 @@
     <p:sldId id="265" r:id="rId4"/>
     <p:sldId id="271" r:id="rId5"/>
     <p:sldId id="273" r:id="rId6"/>
-    <p:sldId id="267" r:id="rId7"/>
-    <p:sldId id="277" r:id="rId8"/>
-    <p:sldId id="278" r:id="rId9"/>
-    <p:sldId id="275" r:id="rId10"/>
-    <p:sldId id="270" r:id="rId11"/>
-    <p:sldId id="269" r:id="rId12"/>
+    <p:sldId id="277" r:id="rId7"/>
+    <p:sldId id="278" r:id="rId8"/>
+    <p:sldId id="275" r:id="rId9"/>
+    <p:sldId id="270" r:id="rId10"/>
+    <p:sldId id="269" r:id="rId11"/>
   </p:sldIdLst>
   <p:sldSz cx="12192000" cy="6858000"/>
   <p:notesSz cx="6858000" cy="9144000"/>
@@ -345,7 +344,7 @@
           <a:p>
             <a:fld id="{88D38747-4367-4BD2-8D51-C97E202738E2}" type="datetime1">
               <a:rPr lang="en-US" smtClean="0"/>
-              <a:t>5/2/22</a:t>
+              <a:t>5/3/22</a:t>
             </a:fld>
             <a:endParaRPr lang="en-US" dirty="0"/>
           </a:p>
@@ -681,7 +680,7 @@
           <a:p>
             <a:fld id="{217E833E-1B6D-415F-AD29-75AE8C43BD0D}" type="datetime1">
               <a:rPr lang="en-US" smtClean="0"/>
-              <a:t>5/2/22</a:t>
+              <a:t>5/3/22</a:t>
             </a:fld>
             <a:endParaRPr lang="en-US" dirty="0"/>
           </a:p>
@@ -984,7 +983,7 @@
           <a:p>
             <a:fld id="{8452596F-08A7-4B70-989A-F2B1CF31E66B}" type="datetime1">
               <a:rPr lang="en-US" smtClean="0"/>
-              <a:t>5/2/22</a:t>
+              <a:t>5/3/22</a:t>
             </a:fld>
             <a:endParaRPr lang="en-US" dirty="0"/>
           </a:p>
@@ -1232,7 +1231,7 @@
           <a:p>
             <a:fld id="{73C55A3C-5767-4844-A0A3-83778C2E5409}" type="datetime1">
               <a:rPr lang="en-US" smtClean="0"/>
-              <a:t>5/2/22</a:t>
+              <a:t>5/3/22</a:t>
             </a:fld>
             <a:endParaRPr lang="en-US" dirty="0"/>
           </a:p>
@@ -1640,7 +1639,7 @@
           <a:p>
             <a:fld id="{CAE507A8-A5CF-4D38-AB86-7EDDA87A85D4}" type="datetime1">
               <a:rPr lang="en-US" smtClean="0"/>
-              <a:t>5/2/22</a:t>
+              <a:t>5/3/22</a:t>
             </a:fld>
             <a:endParaRPr lang="en-US" dirty="0"/>
           </a:p>
@@ -1956,7 +1955,7 @@
           <a:p>
             <a:fld id="{BDFCD27C-8599-43EF-BA1D-14DDC1946E06}" type="datetime1">
               <a:rPr lang="en-US" smtClean="0"/>
-              <a:t>5/2/22</a:t>
+              <a:t>5/3/22</a:t>
             </a:fld>
             <a:endParaRPr lang="en-US" dirty="0"/>
           </a:p>
@@ -2501,7 +2500,7 @@
           <a:p>
             <a:fld id="{073ED0CC-082F-4160-86E5-0D6041F12778}" type="datetime1">
               <a:rPr lang="en-US" smtClean="0"/>
-              <a:t>5/2/22</a:t>
+              <a:t>5/3/22</a:t>
             </a:fld>
             <a:endParaRPr lang="en-US" dirty="0"/>
           </a:p>
@@ -2698,7 +2697,7 @@
           <a:p>
             <a:fld id="{A143DE9B-B678-4EFB-BB7D-A4370204A0B0}" type="datetime1">
               <a:rPr lang="en-US" smtClean="0"/>
-              <a:t>5/2/22</a:t>
+              <a:t>5/3/22</a:t>
             </a:fld>
             <a:endParaRPr lang="en-US" dirty="0"/>
           </a:p>
@@ -2912,7 +2911,7 @@
           <a:p>
             <a:fld id="{E68812DA-F765-4142-A6A3-A8ED7235E082}" type="datetime1">
               <a:rPr lang="en-US" smtClean="0"/>
-              <a:t>5/2/22</a:t>
+              <a:t>5/3/22</a:t>
             </a:fld>
             <a:endParaRPr lang="en-US" dirty="0"/>
           </a:p>
@@ -3282,7 +3281,7 @@
           <a:p>
             <a:fld id="{3E0277FD-7DE6-41D4-930D-AC99F5AFE54E}" type="datetime1">
               <a:rPr lang="en-US" smtClean="0"/>
-              <a:t>5/2/22</a:t>
+              <a:t>5/3/22</a:t>
             </a:fld>
             <a:endParaRPr lang="en-US" dirty="0"/>
           </a:p>
@@ -3686,7 +3685,7 @@
           <a:p>
             <a:fld id="{9EA15526-7079-4B7B-987C-1B5FAE11A0FF}" type="datetime1">
               <a:rPr lang="en-US" smtClean="0"/>
-              <a:t>5/2/22</a:t>
+              <a:t>5/3/22</a:t>
             </a:fld>
             <a:endParaRPr lang="en-US" dirty="0"/>
           </a:p>
@@ -4002,7 +4001,7 @@
           <a:p>
             <a:fld id="{073ED0CC-082F-4160-86E5-0D6041F12778}" type="datetime1">
               <a:rPr lang="en-US" smtClean="0"/>
-              <a:t>5/2/22</a:t>
+              <a:t>5/3/22</a:t>
             </a:fld>
             <a:endParaRPr lang="en-US" dirty="0"/>
           </a:p>
@@ -6210,760 +6209,6 @@
         </p:nvSpPr>
         <p:spPr>
           <a:xfrm>
-            <a:off x="2611808" y="387626"/>
-            <a:ext cx="7958331" cy="695739"/>
-          </a:xfrm>
-          <a:prstGeom prst="rect">
-            <a:avLst/>
-          </a:prstGeom>
-        </p:spPr>
-        <p:txBody>
-          <a:bodyPr vert="horz" lIns="91440" tIns="45720" rIns="91440" bIns="45720" rtlCol="0" anchor="b">
-            <a:normAutofit/>
-          </a:bodyPr>
-          <a:lstStyle/>
-          <a:p>
-            <a:pPr defTabSz="914400">
-              <a:lnSpc>
-                <a:spcPct val="90000"/>
-              </a:lnSpc>
-              <a:spcBef>
-                <a:spcPct val="0"/>
-              </a:spcBef>
-              <a:spcAft>
-                <a:spcPts val="600"/>
-              </a:spcAft>
-            </a:pPr>
-            <a:r>
-              <a:rPr lang="en-US" sz="4400" dirty="0">
-                <a:solidFill>
-                  <a:srgbClr val="1F2D29"/>
-                </a:solidFill>
-                <a:latin typeface="+mj-lt"/>
-                <a:ea typeface="+mj-ea"/>
-                <a:cs typeface="+mj-cs"/>
-              </a:rPr>
-              <a:t>COVID-19 Database</a:t>
-            </a:r>
-          </a:p>
-        </p:txBody>
-      </p:sp>
-      <p:pic>
-        <p:nvPicPr>
-          <p:cNvPr id="15" name="Picture 14">
-            <a:extLst>
-              <a:ext uri="{FF2B5EF4-FFF2-40B4-BE49-F238E27FC236}">
-                <a16:creationId xmlns:a16="http://schemas.microsoft.com/office/drawing/2014/main" id="{A1342298-5A6D-AB68-DAF1-B9E9F75657C1}"/>
-              </a:ext>
-            </a:extLst>
-          </p:cNvPr>
-          <p:cNvPicPr>
-            <a:picLocks noChangeAspect="1"/>
-          </p:cNvPicPr>
-          <p:nvPr/>
-        </p:nvPicPr>
-        <p:blipFill>
-          <a:blip r:embed="rId4"/>
-          <a:stretch>
-            <a:fillRect/>
-          </a:stretch>
-        </p:blipFill>
-        <p:spPr>
-          <a:xfrm>
-            <a:off x="9206967" y="1652303"/>
-            <a:ext cx="2242716" cy="4374996"/>
-          </a:xfrm>
-          <a:prstGeom prst="rect">
-            <a:avLst/>
-          </a:prstGeom>
-        </p:spPr>
-      </p:pic>
-      <p:pic>
-        <p:nvPicPr>
-          <p:cNvPr id="4" name="Picture 3" descr="Graphical user interface, application&#10;&#10;Description automatically generated">
-            <a:extLst>
-              <a:ext uri="{FF2B5EF4-FFF2-40B4-BE49-F238E27FC236}">
-                <a16:creationId xmlns:a16="http://schemas.microsoft.com/office/drawing/2014/main" id="{E837D942-C0A5-B51C-A3AE-54A5D1D77D45}"/>
-              </a:ext>
-            </a:extLst>
-          </p:cNvPr>
-          <p:cNvPicPr>
-            <a:picLocks noChangeAspect="1"/>
-          </p:cNvPicPr>
-          <p:nvPr/>
-        </p:nvPicPr>
-        <p:blipFill>
-          <a:blip r:embed="rId5"/>
-          <a:stretch>
-            <a:fillRect/>
-          </a:stretch>
-        </p:blipFill>
-        <p:spPr>
-          <a:xfrm>
-            <a:off x="2025860" y="1939771"/>
-            <a:ext cx="6977697" cy="3800060"/>
-          </a:xfrm>
-          <a:prstGeom prst="flowChartPunchedCard">
-            <a:avLst/>
-          </a:prstGeom>
-        </p:spPr>
-      </p:pic>
-    </p:spTree>
-    <p:extLst>
-      <p:ext uri="{BB962C8B-B14F-4D97-AF65-F5344CB8AC3E}">
-        <p14:creationId xmlns:p14="http://schemas.microsoft.com/office/powerpoint/2010/main" val="2430739966"/>
-      </p:ext>
-    </p:extLst>
-  </p:cSld>
-  <p:clrMapOvr>
-    <a:overrideClrMapping bg1="lt1" tx1="dk1" bg2="lt2" tx2="dk2" accent1="accent1" accent2="accent2" accent3="accent3" accent4="accent4" accent5="accent5" accent6="accent6" hlink="hlink" folHlink="folHlink"/>
-  </p:clrMapOvr>
-</p:sld>
-</file>
-
-<file path=ppt/slides/slide11.xml><?xml version="1.0" encoding="utf-8"?>
-<p:sld xmlns:a="http://schemas.openxmlformats.org/drawingml/2006/main" xmlns:r="http://schemas.openxmlformats.org/officeDocument/2006/relationships" xmlns:p="http://schemas.openxmlformats.org/presentationml/2006/main">
-  <p:cSld>
-    <p:bg>
-      <p:bgPr>
-        <a:solidFill>
-          <a:schemeClr val="bg1"/>
-        </a:solidFill>
-        <a:effectLst/>
-      </p:bgPr>
-    </p:bg>
-    <p:spTree>
-      <p:nvGrpSpPr>
-        <p:cNvPr id="1" name=""/>
-        <p:cNvGrpSpPr/>
-        <p:nvPr/>
-      </p:nvGrpSpPr>
-      <p:grpSpPr>
-        <a:xfrm>
-          <a:off x="0" y="0"/>
-          <a:ext cx="0" cy="0"/>
-          <a:chOff x="0" y="0"/>
-          <a:chExt cx="0" cy="0"/>
-        </a:xfrm>
-      </p:grpSpPr>
-      <p:pic>
-        <p:nvPicPr>
-          <p:cNvPr id="55" name="Picture 54">
-            <a:extLst>
-              <a:ext uri="{FF2B5EF4-FFF2-40B4-BE49-F238E27FC236}">
-                <a16:creationId xmlns:a16="http://schemas.microsoft.com/office/drawing/2014/main" id="{3DBBA26C-89C3-411F-9753-606A413F89AF}"/>
-              </a:ext>
-              <a:ext uri="{C183D7F6-B498-43B3-948B-1728B52AA6E4}">
-                <adec:decorative xmlns:adec="http://schemas.microsoft.com/office/drawing/2017/decorative" val="1"/>
-              </a:ext>
-            </a:extLst>
-          </p:cNvPr>
-          <p:cNvPicPr>
-            <a:picLocks noGrp="1" noRot="1" noChangeAspect="1" noMove="1" noResize="1" noEditPoints="1" noAdjustHandles="1" noChangeArrowheads="1" noChangeShapeType="1" noCrop="1"/>
-          </p:cNvPicPr>
-          <p:nvPr>
-            <p:extLst>
-              <p:ext uri="{386F3935-93C4-4BCD-93E2-E3B085C9AB24}">
-                <p16:designElem xmlns:p16="http://schemas.microsoft.com/office/powerpoint/2015/main" val="1"/>
-              </p:ext>
-            </p:extLst>
-          </p:nvPr>
-        </p:nvPicPr>
-        <p:blipFill>
-          <a:blip r:embed="rId2">
-            <a:extLst>
-              <a:ext uri="{28A0092B-C50C-407E-A947-70E740481C1C}">
-                <a14:useLocalDpi xmlns:a14="http://schemas.microsoft.com/office/drawing/2010/main" val="0"/>
-              </a:ext>
-            </a:extLst>
-          </a:blip>
-          <a:stretch>
-            <a:fillRect/>
-          </a:stretch>
-        </p:blipFill>
-        <p:spPr>
-          <a:xfrm>
-            <a:off x="2831794" y="2105202"/>
-            <a:ext cx="9360205" cy="4752798"/>
-          </a:xfrm>
-          <a:prstGeom prst="rect">
-            <a:avLst/>
-          </a:prstGeom>
-        </p:spPr>
-      </p:pic>
-      <p:pic>
-        <p:nvPicPr>
-          <p:cNvPr id="57" name="Picture 56">
-            <a:extLst>
-              <a:ext uri="{FF2B5EF4-FFF2-40B4-BE49-F238E27FC236}">
-                <a16:creationId xmlns:a16="http://schemas.microsoft.com/office/drawing/2014/main" id="{EEAD2215-6311-4D1C-B6B5-F57CB6BFCBCA}"/>
-              </a:ext>
-              <a:ext uri="{C183D7F6-B498-43B3-948B-1728B52AA6E4}">
-                <adec:decorative xmlns:adec="http://schemas.microsoft.com/office/drawing/2017/decorative" val="1"/>
-              </a:ext>
-            </a:extLst>
-          </p:cNvPr>
-          <p:cNvPicPr>
-            <a:picLocks noGrp="1" noRot="1" noChangeAspect="1" noMove="1" noResize="1" noEditPoints="1" noAdjustHandles="1" noChangeArrowheads="1" noChangeShapeType="1" noCrop="1"/>
-          </p:cNvPicPr>
-          <p:nvPr>
-            <p:extLst>
-              <p:ext uri="{386F3935-93C4-4BCD-93E2-E3B085C9AB24}">
-                <p16:designElem xmlns:p16="http://schemas.microsoft.com/office/powerpoint/2015/main" val="1"/>
-              </p:ext>
-            </p:extLst>
-          </p:nvPr>
-        </p:nvPicPr>
-        <p:blipFill>
-          <a:blip r:embed="rId3">
-            <a:extLst>
-              <a:ext uri="{28A0092B-C50C-407E-A947-70E740481C1C}">
-                <a14:useLocalDpi xmlns:a14="http://schemas.microsoft.com/office/drawing/2010/main" val="0"/>
-              </a:ext>
-            </a:extLst>
-          </a:blip>
-          <a:stretch>
-            <a:fillRect/>
-          </a:stretch>
-        </p:blipFill>
-        <p:spPr>
-          <a:xfrm>
-            <a:off x="0" y="0"/>
-            <a:ext cx="12189867" cy="6858000"/>
-          </a:xfrm>
-          <a:prstGeom prst="rect">
-            <a:avLst/>
-          </a:prstGeom>
-        </p:spPr>
-      </p:pic>
-      <p:sp>
-        <p:nvSpPr>
-          <p:cNvPr id="59" name="Rectangle 58">
-            <a:extLst>
-              <a:ext uri="{FF2B5EF4-FFF2-40B4-BE49-F238E27FC236}">
-                <a16:creationId xmlns:a16="http://schemas.microsoft.com/office/drawing/2014/main" id="{7BA5DE79-30D1-4A10-8DB9-0A6E523A9723}"/>
-              </a:ext>
-              <a:ext uri="{C183D7F6-B498-43B3-948B-1728B52AA6E4}">
-                <adec:decorative xmlns:adec="http://schemas.microsoft.com/office/drawing/2017/decorative" val="1"/>
-              </a:ext>
-            </a:extLst>
-          </p:cNvPr>
-          <p:cNvSpPr>
-            <a:spLocks noGrp="1" noRot="1" noChangeAspect="1" noMove="1" noResize="1" noEditPoints="1" noAdjustHandles="1" noChangeArrowheads="1" noChangeShapeType="1" noTextEdit="1"/>
-          </p:cNvSpPr>
-          <p:nvPr>
-            <p:extLst>
-              <p:ext uri="{386F3935-93C4-4BCD-93E2-E3B085C9AB24}">
-                <p16:designElem xmlns:p16="http://schemas.microsoft.com/office/powerpoint/2015/main" val="1"/>
-              </p:ext>
-            </p:extLst>
-          </p:nvPr>
-        </p:nvSpPr>
-        <p:spPr>
-          <a:xfrm>
-            <a:off x="0" y="0"/>
-            <a:ext cx="964174" cy="6858000"/>
-          </a:xfrm>
-          <a:prstGeom prst="rect">
-            <a:avLst/>
-          </a:prstGeom>
-          <a:solidFill>
-            <a:schemeClr val="bg2"/>
-          </a:solidFill>
-          <a:ln>
-            <a:noFill/>
-          </a:ln>
-        </p:spPr>
-        <p:style>
-          <a:lnRef idx="2">
-            <a:schemeClr val="accent1">
-              <a:shade val="50000"/>
-            </a:schemeClr>
-          </a:lnRef>
-          <a:fillRef idx="1">
-            <a:schemeClr val="accent1"/>
-          </a:fillRef>
-          <a:effectRef idx="0">
-            <a:schemeClr val="accent1"/>
-          </a:effectRef>
-          <a:fontRef idx="minor">
-            <a:schemeClr val="lt1"/>
-          </a:fontRef>
-        </p:style>
-      </p:sp>
-      <p:sp>
-        <p:nvSpPr>
-          <p:cNvPr id="61" name="Rectangle 60">
-            <a:extLst>
-              <a:ext uri="{FF2B5EF4-FFF2-40B4-BE49-F238E27FC236}">
-                <a16:creationId xmlns:a16="http://schemas.microsoft.com/office/drawing/2014/main" id="{9ABD0D63-D23F-4AE7-8270-4185EF9C1C25}"/>
-              </a:ext>
-              <a:ext uri="{C183D7F6-B498-43B3-948B-1728B52AA6E4}">
-                <adec:decorative xmlns:adec="http://schemas.microsoft.com/office/drawing/2017/decorative" val="1"/>
-              </a:ext>
-            </a:extLst>
-          </p:cNvPr>
-          <p:cNvSpPr>
-            <a:spLocks noGrp="1" noRot="1" noChangeAspect="1" noMove="1" noResize="1" noEditPoints="1" noAdjustHandles="1" noChangeArrowheads="1" noChangeShapeType="1" noTextEdit="1"/>
-          </p:cNvSpPr>
-          <p:nvPr>
-            <p:extLst>
-              <p:ext uri="{386F3935-93C4-4BCD-93E2-E3B085C9AB24}">
-                <p16:designElem xmlns:p16="http://schemas.microsoft.com/office/powerpoint/2015/main" val="1"/>
-              </p:ext>
-            </p:extLst>
-          </p:nvPr>
-        </p:nvSpPr>
-        <p:spPr>
-          <a:xfrm>
-            <a:off x="962042" y="0"/>
-            <a:ext cx="45719" cy="6858000"/>
-          </a:xfrm>
-          <a:prstGeom prst="rect">
-            <a:avLst/>
-          </a:prstGeom>
-          <a:solidFill>
-            <a:schemeClr val="accent6"/>
-          </a:solidFill>
-          <a:ln>
-            <a:noFill/>
-          </a:ln>
-        </p:spPr>
-        <p:style>
-          <a:lnRef idx="2">
-            <a:schemeClr val="accent1">
-              <a:shade val="50000"/>
-            </a:schemeClr>
-          </a:lnRef>
-          <a:fillRef idx="1">
-            <a:schemeClr val="accent1"/>
-          </a:fillRef>
-          <a:effectRef idx="0">
-            <a:schemeClr val="accent1"/>
-          </a:effectRef>
-          <a:fontRef idx="minor">
-            <a:schemeClr val="lt1"/>
-          </a:fontRef>
-        </p:style>
-      </p:sp>
-      <p:sp>
-        <p:nvSpPr>
-          <p:cNvPr id="63" name="Rectangle 62">
-            <a:extLst>
-              <a:ext uri="{FF2B5EF4-FFF2-40B4-BE49-F238E27FC236}">
-                <a16:creationId xmlns:a16="http://schemas.microsoft.com/office/drawing/2014/main" id="{D5B0B43F-2CE7-4C6C-BABC-EE342B32827C}"/>
-              </a:ext>
-              <a:ext uri="{C183D7F6-B498-43B3-948B-1728B52AA6E4}">
-                <adec:decorative xmlns:adec="http://schemas.microsoft.com/office/drawing/2017/decorative" val="1"/>
-              </a:ext>
-            </a:extLst>
-          </p:cNvPr>
-          <p:cNvSpPr>
-            <a:spLocks noGrp="1" noRot="1" noChangeAspect="1" noMove="1" noResize="1" noEditPoints="1" noAdjustHandles="1" noChangeArrowheads="1" noChangeShapeType="1" noTextEdit="1"/>
-          </p:cNvSpPr>
-          <p:nvPr>
-            <p:extLst>
-              <p:ext uri="{386F3935-93C4-4BCD-93E2-E3B085C9AB24}">
-                <p16:designElem xmlns:p16="http://schemas.microsoft.com/office/powerpoint/2015/main" val="1"/>
-              </p:ext>
-            </p:extLst>
-          </p:nvPr>
-        </p:nvSpPr>
-        <p:spPr>
-          <a:xfrm>
-            <a:off x="1004479" y="0"/>
-            <a:ext cx="10372316" cy="6858000"/>
-          </a:xfrm>
-          <a:prstGeom prst="rect">
-            <a:avLst/>
-          </a:prstGeom>
-          <a:solidFill>
-            <a:schemeClr val="bg2">
-              <a:alpha val="92000"/>
-            </a:schemeClr>
-          </a:solidFill>
-          <a:ln>
-            <a:noFill/>
-          </a:ln>
-        </p:spPr>
-        <p:style>
-          <a:lnRef idx="2">
-            <a:schemeClr val="accent1">
-              <a:shade val="50000"/>
-            </a:schemeClr>
-          </a:lnRef>
-          <a:fillRef idx="1">
-            <a:schemeClr val="accent1"/>
-          </a:fillRef>
-          <a:effectRef idx="0">
-            <a:schemeClr val="accent1"/>
-          </a:effectRef>
-          <a:fontRef idx="minor">
-            <a:schemeClr val="lt1"/>
-          </a:fontRef>
-        </p:style>
-      </p:sp>
-      <p:sp>
-        <p:nvSpPr>
-          <p:cNvPr id="65" name="Rectangle 64">
-            <a:extLst>
-              <a:ext uri="{FF2B5EF4-FFF2-40B4-BE49-F238E27FC236}">
-                <a16:creationId xmlns:a16="http://schemas.microsoft.com/office/drawing/2014/main" id="{85459F07-63F9-48CF-B725-A873C4BC3650}"/>
-              </a:ext>
-              <a:ext uri="{C183D7F6-B498-43B3-948B-1728B52AA6E4}">
-                <adec:decorative xmlns:adec="http://schemas.microsoft.com/office/drawing/2017/decorative" val="1"/>
-              </a:ext>
-            </a:extLst>
-          </p:cNvPr>
-          <p:cNvSpPr>
-            <a:spLocks noGrp="1" noRot="1" noChangeAspect="1" noMove="1" noResize="1" noEditPoints="1" noAdjustHandles="1" noChangeArrowheads="1" noChangeShapeType="1" noTextEdit="1"/>
-          </p:cNvSpPr>
-          <p:nvPr>
-            <p:extLst>
-              <p:ext uri="{386F3935-93C4-4BCD-93E2-E3B085C9AB24}">
-                <p16:designElem xmlns:p16="http://schemas.microsoft.com/office/powerpoint/2015/main" val="1"/>
-              </p:ext>
-            </p:extLst>
-          </p:nvPr>
-        </p:nvSpPr>
-        <p:spPr>
-          <a:xfrm>
-            <a:off x="11377328" y="0"/>
-            <a:ext cx="27432" cy="6858000"/>
-          </a:xfrm>
-          <a:prstGeom prst="rect">
-            <a:avLst/>
-          </a:prstGeom>
-          <a:solidFill>
-            <a:schemeClr val="accent6"/>
-          </a:solidFill>
-          <a:ln>
-            <a:noFill/>
-          </a:ln>
-        </p:spPr>
-        <p:style>
-          <a:lnRef idx="2">
-            <a:schemeClr val="accent1">
-              <a:shade val="50000"/>
-            </a:schemeClr>
-          </a:lnRef>
-          <a:fillRef idx="1">
-            <a:schemeClr val="accent1"/>
-          </a:fillRef>
-          <a:effectRef idx="0">
-            <a:schemeClr val="accent1"/>
-          </a:effectRef>
-          <a:fontRef idx="minor">
-            <a:schemeClr val="lt1"/>
-          </a:fontRef>
-        </p:style>
-      </p:sp>
-      <p:sp>
-        <p:nvSpPr>
-          <p:cNvPr id="67" name="TextBox 66">
-            <a:extLst>
-              <a:ext uri="{FF2B5EF4-FFF2-40B4-BE49-F238E27FC236}">
-                <a16:creationId xmlns:a16="http://schemas.microsoft.com/office/drawing/2014/main" id="{14B83E1E-DAC1-4851-84FF-D6FE1649DE0B}"/>
-              </a:ext>
-              <a:ext uri="{C183D7F6-B498-43B3-948B-1728B52AA6E4}">
-                <adec:decorative xmlns:adec="http://schemas.microsoft.com/office/drawing/2017/decorative" val="1"/>
-              </a:ext>
-            </a:extLst>
-          </p:cNvPr>
-          <p:cNvSpPr txBox="1">
-            <a:spLocks noGrp="1" noRot="1" noChangeAspect="1" noMove="1" noResize="1" noEditPoints="1" noAdjustHandles="1" noChangeArrowheads="1" noChangeShapeType="1" noTextEdit="1"/>
-          </p:cNvSpPr>
-          <p:nvPr>
-            <p:extLst>
-              <p:ext uri="{386F3935-93C4-4BCD-93E2-E3B085C9AB24}">
-                <p16:designElem xmlns:p16="http://schemas.microsoft.com/office/powerpoint/2015/main" val="1"/>
-              </p:ext>
-            </p:extLst>
-          </p:nvPr>
-        </p:nvSpPr>
-        <p:spPr>
-          <a:xfrm>
-            <a:off x="2194943" y="641225"/>
-            <a:ext cx="415636" cy="369332"/>
-          </a:xfrm>
-          <a:prstGeom prst="rect">
-            <a:avLst/>
-          </a:prstGeom>
-          <a:noFill/>
-        </p:spPr>
-        <p:txBody>
-          <a:bodyPr wrap="square" rtlCol="0">
-            <a:spAutoFit/>
-          </a:bodyPr>
-          <a:lstStyle/>
-          <a:p>
-            <a:pPr algn="r">
-              <a:spcAft>
-                <a:spcPts val="600"/>
-              </a:spcAft>
-            </a:pPr>
-            <a:r>
-              <a:rPr lang="en-US" sz="1800" dirty="0">
-                <a:solidFill>
-                  <a:schemeClr val="accent6"/>
-                </a:solidFill>
-                <a:latin typeface="Wingdings 3" panose="05040102010807070707" pitchFamily="18" charset="2"/>
-              </a:rPr>
-              <a:t>z</a:t>
-            </a:r>
-            <a:endParaRPr lang="en-US" sz="1000" dirty="0">
-              <a:solidFill>
-                <a:schemeClr val="accent6"/>
-              </a:solidFill>
-              <a:latin typeface="MS Shell Dlg 2" panose="020B0604030504040204" pitchFamily="34" charset="0"/>
-            </a:endParaRPr>
-          </a:p>
-        </p:txBody>
-      </p:sp>
-      <p:sp>
-        <p:nvSpPr>
-          <p:cNvPr id="69" name="Rectangle 68">
-            <a:extLst>
-              <a:ext uri="{FF2B5EF4-FFF2-40B4-BE49-F238E27FC236}">
-                <a16:creationId xmlns:a16="http://schemas.microsoft.com/office/drawing/2014/main" id="{D0BE3D13-5BE5-4B05-AFCF-2A2E059D29F8}"/>
-              </a:ext>
-              <a:ext uri="{C183D7F6-B498-43B3-948B-1728B52AA6E4}">
-                <adec:decorative xmlns:adec="http://schemas.microsoft.com/office/drawing/2017/decorative" val="1"/>
-              </a:ext>
-            </a:extLst>
-          </p:cNvPr>
-          <p:cNvSpPr>
-            <a:spLocks noGrp="1" noRot="1" noChangeAspect="1" noMove="1" noResize="1" noEditPoints="1" noAdjustHandles="1" noChangeArrowheads="1" noChangeShapeType="1" noTextEdit="1"/>
-          </p:cNvSpPr>
-          <p:nvPr>
-            <p:extLst>
-              <p:ext uri="{386F3935-93C4-4BCD-93E2-E3B085C9AB24}">
-                <p16:designElem xmlns:p16="http://schemas.microsoft.com/office/powerpoint/2015/main" val="1"/>
-              </p:ext>
-            </p:extLst>
-          </p:nvPr>
-        </p:nvSpPr>
-        <p:spPr>
-          <a:xfrm>
-            <a:off x="0" y="-1"/>
-            <a:ext cx="12192000" cy="6858001"/>
-          </a:xfrm>
-          <a:prstGeom prst="rect">
-            <a:avLst/>
-          </a:prstGeom>
-          <a:solidFill>
-            <a:srgbClr val="FFFFFF"/>
-          </a:solidFill>
-          <a:ln>
-            <a:noFill/>
-          </a:ln>
-        </p:spPr>
-        <p:style>
-          <a:lnRef idx="2">
-            <a:schemeClr val="accent1">
-              <a:shade val="50000"/>
-            </a:schemeClr>
-          </a:lnRef>
-          <a:fillRef idx="1">
-            <a:schemeClr val="accent1"/>
-          </a:fillRef>
-          <a:effectRef idx="0">
-            <a:schemeClr val="accent1"/>
-          </a:effectRef>
-          <a:fontRef idx="minor">
-            <a:schemeClr val="lt1"/>
-          </a:fontRef>
-        </p:style>
-        <p:txBody>
-          <a:bodyPr rtlCol="0" anchor="ctr"/>
-          <a:lstStyle/>
-          <a:p>
-            <a:pPr algn="ctr"/>
-            <a:endParaRPr lang="en-US" dirty="0"/>
-          </a:p>
-        </p:txBody>
-      </p:sp>
-      <p:sp>
-        <p:nvSpPr>
-          <p:cNvPr id="71" name="Rectangle 70">
-            <a:extLst>
-              <a:ext uri="{FF2B5EF4-FFF2-40B4-BE49-F238E27FC236}">
-                <a16:creationId xmlns:a16="http://schemas.microsoft.com/office/drawing/2014/main" id="{76562092-3AA7-4EF0-9007-C44F879A1308}"/>
-              </a:ext>
-              <a:ext uri="{C183D7F6-B498-43B3-948B-1728B52AA6E4}">
-                <adec:decorative xmlns:adec="http://schemas.microsoft.com/office/drawing/2017/decorative" val="1"/>
-              </a:ext>
-            </a:extLst>
-          </p:cNvPr>
-          <p:cNvSpPr>
-            <a:spLocks noGrp="1" noRot="1" noChangeAspect="1" noMove="1" noResize="1" noEditPoints="1" noAdjustHandles="1" noChangeArrowheads="1" noChangeShapeType="1" noTextEdit="1"/>
-          </p:cNvSpPr>
-          <p:nvPr>
-            <p:extLst>
-              <p:ext uri="{386F3935-93C4-4BCD-93E2-E3B085C9AB24}">
-                <p16:designElem xmlns:p16="http://schemas.microsoft.com/office/powerpoint/2015/main" val="1"/>
-              </p:ext>
-            </p:extLst>
-          </p:nvPr>
-        </p:nvSpPr>
-        <p:spPr>
-          <a:xfrm>
-            <a:off x="0" y="0"/>
-            <a:ext cx="964174" cy="6858000"/>
-          </a:xfrm>
-          <a:prstGeom prst="rect">
-            <a:avLst/>
-          </a:prstGeom>
-          <a:solidFill>
-            <a:schemeClr val="tx2"/>
-          </a:solidFill>
-          <a:ln>
-            <a:noFill/>
-          </a:ln>
-        </p:spPr>
-        <p:style>
-          <a:lnRef idx="2">
-            <a:schemeClr val="accent1">
-              <a:shade val="50000"/>
-            </a:schemeClr>
-          </a:lnRef>
-          <a:fillRef idx="1">
-            <a:schemeClr val="accent1"/>
-          </a:fillRef>
-          <a:effectRef idx="0">
-            <a:schemeClr val="accent1"/>
-          </a:effectRef>
-          <a:fontRef idx="minor">
-            <a:schemeClr val="lt1"/>
-          </a:fontRef>
-        </p:style>
-      </p:sp>
-      <p:sp>
-        <p:nvSpPr>
-          <p:cNvPr id="73" name="Oval 72">
-            <a:extLst>
-              <a:ext uri="{FF2B5EF4-FFF2-40B4-BE49-F238E27FC236}">
-                <a16:creationId xmlns:a16="http://schemas.microsoft.com/office/drawing/2014/main" id="{1AC85C80-0175-4214-A13D-03C224658C16}"/>
-              </a:ext>
-              <a:ext uri="{C183D7F6-B498-43B3-948B-1728B52AA6E4}">
-                <adec:decorative xmlns:adec="http://schemas.microsoft.com/office/drawing/2017/decorative" val="1"/>
-              </a:ext>
-            </a:extLst>
-          </p:cNvPr>
-          <p:cNvSpPr>
-            <a:spLocks noGrp="1" noRot="1" noChangeAspect="1" noMove="1" noResize="1" noEditPoints="1" noAdjustHandles="1" noChangeArrowheads="1" noChangeShapeType="1" noTextEdit="1"/>
-          </p:cNvSpPr>
-          <p:nvPr>
-            <p:extLst>
-              <p:ext uri="{386F3935-93C4-4BCD-93E2-E3B085C9AB24}">
-                <p16:designElem xmlns:p16="http://schemas.microsoft.com/office/powerpoint/2015/main" val="1"/>
-              </p:ext>
-            </p:extLst>
-          </p:nvPr>
-        </p:nvSpPr>
-        <p:spPr>
-          <a:xfrm>
-            <a:off x="1770108" y="985292"/>
-            <a:ext cx="1345319" cy="1345319"/>
-          </a:xfrm>
-          <a:prstGeom prst="ellipse">
-            <a:avLst/>
-          </a:prstGeom>
-          <a:solidFill>
-            <a:schemeClr val="accent1">
-              <a:lumMod val="40000"/>
-              <a:lumOff val="60000"/>
-              <a:alpha val="90000"/>
-            </a:schemeClr>
-          </a:solidFill>
-          <a:ln>
-            <a:noFill/>
-          </a:ln>
-        </p:spPr>
-        <p:style>
-          <a:lnRef idx="2">
-            <a:schemeClr val="accent1">
-              <a:shade val="50000"/>
-            </a:schemeClr>
-          </a:lnRef>
-          <a:fillRef idx="1">
-            <a:schemeClr val="accent1"/>
-          </a:fillRef>
-          <a:effectRef idx="0">
-            <a:schemeClr val="accent1"/>
-          </a:effectRef>
-          <a:fontRef idx="minor">
-            <a:schemeClr val="lt1"/>
-          </a:fontRef>
-        </p:style>
-        <p:txBody>
-          <a:bodyPr rtlCol="0" anchor="ctr"/>
-          <a:lstStyle/>
-          <a:p>
-            <a:pPr algn="ctr"/>
-            <a:endParaRPr lang="en-US" dirty="0"/>
-          </a:p>
-        </p:txBody>
-      </p:sp>
-      <p:pic>
-        <p:nvPicPr>
-          <p:cNvPr id="75" name="Picture 74">
-            <a:extLst>
-              <a:ext uri="{FF2B5EF4-FFF2-40B4-BE49-F238E27FC236}">
-                <a16:creationId xmlns:a16="http://schemas.microsoft.com/office/drawing/2014/main" id="{E60B620B-3E81-4075-BC12-D4FB3E299C70}"/>
-              </a:ext>
-              <a:ext uri="{C183D7F6-B498-43B3-948B-1728B52AA6E4}">
-                <adec:decorative xmlns:adec="http://schemas.microsoft.com/office/drawing/2017/decorative" val="1"/>
-              </a:ext>
-            </a:extLst>
-          </p:cNvPr>
-          <p:cNvPicPr>
-            <a:picLocks noGrp="1" noRot="1" noChangeAspect="1" noMove="1" noResize="1" noEditPoints="1" noAdjustHandles="1" noChangeArrowheads="1" noChangeShapeType="1" noCrop="1"/>
-          </p:cNvPicPr>
-          <p:nvPr>
-            <p:extLst>
-              <p:ext uri="{386F3935-93C4-4BCD-93E2-E3B085C9AB24}">
-                <p16:designElem xmlns:p16="http://schemas.microsoft.com/office/powerpoint/2015/main" val="1"/>
-              </p:ext>
-            </p:extLst>
-          </p:nvPr>
-        </p:nvPicPr>
-        <p:blipFill>
-          <a:blip r:embed="rId3">
-            <a:extLst>
-              <a:ext uri="{28A0092B-C50C-407E-A947-70E740481C1C}">
-                <a14:useLocalDpi xmlns:a14="http://schemas.microsoft.com/office/drawing/2010/main" val="0"/>
-              </a:ext>
-            </a:extLst>
-          </a:blip>
-          <a:stretch>
-            <a:fillRect/>
-          </a:stretch>
-        </p:blipFill>
-        <p:spPr>
-          <a:xfrm>
-            <a:off x="2133" y="0"/>
-            <a:ext cx="12189867" cy="6858000"/>
-          </a:xfrm>
-          <a:prstGeom prst="rect">
-            <a:avLst/>
-          </a:prstGeom>
-        </p:spPr>
-      </p:pic>
-      <p:sp>
-        <p:nvSpPr>
-          <p:cNvPr id="8" name="TextBox 7">
-            <a:extLst>
-              <a:ext uri="{FF2B5EF4-FFF2-40B4-BE49-F238E27FC236}">
-                <a16:creationId xmlns:a16="http://schemas.microsoft.com/office/drawing/2014/main" id="{0914A32B-0DA5-0F4C-9F00-864FDB33A88B}"/>
-              </a:ext>
-            </a:extLst>
-          </p:cNvPr>
-          <p:cNvSpPr txBox="1"/>
-          <p:nvPr/>
-        </p:nvSpPr>
-        <p:spPr>
-          <a:xfrm>
             <a:off x="3085847" y="759093"/>
             <a:ext cx="7958331" cy="695739"/>
           </a:xfrm>
@@ -12624,7 +11869,7 @@
                 <a:ea typeface="+mj-ea"/>
                 <a:cs typeface="+mj-cs"/>
               </a:rPr>
-              <a:t>Flask API</a:t>
+              <a:t>Machine Learning Predictions</a:t>
             </a:r>
           </a:p>
         </p:txBody>
@@ -12643,8 +11888,8 @@
         </p:nvSpPr>
         <p:spPr>
           <a:xfrm>
-            <a:off x="2402761" y="1341379"/>
-            <a:ext cx="9001999" cy="2010807"/>
+            <a:off x="2448480" y="1295741"/>
+            <a:ext cx="8858985" cy="1754326"/>
           </a:xfrm>
           <a:prstGeom prst="rect">
             <a:avLst/>
@@ -12658,9 +11903,6 @@
           <a:lstStyle/>
           <a:p>
             <a:pPr marL="285750" indent="-285750">
-              <a:spcAft>
-                <a:spcPts val="1000"/>
-              </a:spcAft>
               <a:buFont typeface="Arial" panose="020B0604020202020204" pitchFamily="34" charset="0"/>
               <a:buChar char="•"/>
             </a:pPr>
@@ -12669,14 +11911,15 @@
                 <a:latin typeface="Calibri" panose="020F0502020204030204" pitchFamily="34" charset="0"/>
                 <a:cs typeface="Calibri" panose="020F0502020204030204" pitchFamily="34" charset="0"/>
               </a:rPr>
-              <a:t>A Flask-powered application was created to extract the full COVID table from the PostgreSQL database and create a JSON file.</a:t>
-            </a:r>
+              <a:t>For our machine learning aspect, we implemented confirmed covid cases, active cases, recovered cases and deaths as independent variables in order to create a machine learning model that would predict the daily number of hospital occupancy.</a:t>
+            </a:r>
+            <a:endParaRPr lang="en-AU" sz="900" dirty="0">
+              <a:latin typeface="Calibri" panose="020F0502020204030204" pitchFamily="34" charset="0"/>
+              <a:cs typeface="Calibri" panose="020F0502020204030204" pitchFamily="34" charset="0"/>
+            </a:endParaRPr>
           </a:p>
           <a:p>
             <a:pPr marL="285750" indent="-285750">
-              <a:spcAft>
-                <a:spcPts val="1000"/>
-              </a:spcAft>
               <a:buFont typeface="Arial" panose="020B0604020202020204" pitchFamily="34" charset="0"/>
               <a:buChar char="•"/>
             </a:pPr>
@@ -12685,14 +11928,11 @@
                 <a:latin typeface="Calibri" panose="020F0502020204030204" pitchFamily="34" charset="0"/>
                 <a:cs typeface="Calibri" panose="020F0502020204030204" pitchFamily="34" charset="0"/>
               </a:rPr>
-              <a:t>This extraction was achieved using a Python library called psycopg2.</a:t>
+              <a:t>Python was used to develop a polynomial regression model and fit it to our COVID data. </a:t>
             </a:r>
           </a:p>
           <a:p>
             <a:pPr marL="285750" indent="-285750">
-              <a:spcAft>
-                <a:spcPts val="1000"/>
-              </a:spcAft>
               <a:buFont typeface="Arial" panose="020B0604020202020204" pitchFamily="34" charset="0"/>
               <a:buChar char="•"/>
             </a:pPr>
@@ -12701,7 +11941,7 @@
                 <a:latin typeface="Calibri" panose="020F0502020204030204" pitchFamily="34" charset="0"/>
                 <a:cs typeface="Calibri" panose="020F0502020204030204" pitchFamily="34" charset="0"/>
               </a:rPr>
-              <a:t>Each column of the database table was assigned to a dictionary, which was then JSONified and returned through the app. This app would then be called on in the JS script to create visualisations.</a:t>
+              <a:t>The python module ‘Pickle’ was used to save the model and run it with a Flask app in order to create this forecasting tool with HTML.</a:t>
             </a:r>
             <a:endParaRPr lang="en-US" dirty="0">
               <a:latin typeface="Calibri" panose="020F0502020204030204" pitchFamily="34" charset="0"/>
@@ -12712,10 +11952,10 @@
       </p:sp>
       <p:pic>
         <p:nvPicPr>
-          <p:cNvPr id="4" name="Picture 3" descr="Text&#10;&#10;Description automatically generated">
+          <p:cNvPr id="15" name="Picture 14" descr="Graphical user interface, text, application, email&#10;&#10;Description automatically generated">
             <a:extLst>
               <a:ext uri="{FF2B5EF4-FFF2-40B4-BE49-F238E27FC236}">
-                <a16:creationId xmlns:a16="http://schemas.microsoft.com/office/drawing/2014/main" id="{662C8660-180A-3346-8634-1803FBFA0A0C}"/>
+                <a16:creationId xmlns:a16="http://schemas.microsoft.com/office/drawing/2014/main" id="{BB514D89-56E0-6AA9-8B1C-467E5496186E}"/>
               </a:ext>
             </a:extLst>
           </p:cNvPr>
@@ -12724,46 +11964,15 @@
           </p:cNvPicPr>
           <p:nvPr/>
         </p:nvPicPr>
-        <p:blipFill>
+        <p:blipFill rotWithShape="1">
           <a:blip r:embed="rId4"/>
-          <a:stretch>
-            <a:fillRect/>
-          </a:stretch>
+          <a:srcRect t="138"/>
+          <a:stretch/>
         </p:blipFill>
         <p:spPr>
           <a:xfrm>
-            <a:off x="6593712" y="3569256"/>
-            <a:ext cx="2766493" cy="3127582"/>
-          </a:xfrm>
-          <a:prstGeom prst="rect">
-            <a:avLst/>
-          </a:prstGeom>
-        </p:spPr>
-      </p:pic>
-      <p:pic>
-        <p:nvPicPr>
-          <p:cNvPr id="6" name="Picture 5" descr="Text&#10;&#10;Description automatically generated">
-            <a:extLst>
-              <a:ext uri="{FF2B5EF4-FFF2-40B4-BE49-F238E27FC236}">
-                <a16:creationId xmlns:a16="http://schemas.microsoft.com/office/drawing/2014/main" id="{3A4B9243-151C-484A-9359-7F5CB22EC55D}"/>
-              </a:ext>
-            </a:extLst>
-          </p:cNvPr>
-          <p:cNvPicPr>
-            <a:picLocks noChangeAspect="1"/>
-          </p:cNvPicPr>
-          <p:nvPr/>
-        </p:nvPicPr>
-        <p:blipFill>
-          <a:blip r:embed="rId5"/>
-          <a:stretch>
-            <a:fillRect/>
-          </a:stretch>
-        </p:blipFill>
-        <p:spPr>
-          <a:xfrm>
-            <a:off x="3230789" y="3569256"/>
-            <a:ext cx="2888709" cy="3127582"/>
+            <a:off x="3745062" y="3327066"/>
+            <a:ext cx="5529105" cy="3361386"/>
           </a:xfrm>
           <a:prstGeom prst="rect">
             <a:avLst/>
@@ -12773,7 +11982,7 @@
     </p:spTree>
     <p:extLst>
       <p:ext uri="{BB962C8B-B14F-4D97-AF65-F5344CB8AC3E}">
-        <p14:creationId xmlns:p14="http://schemas.microsoft.com/office/powerpoint/2010/main" val="2931596296"/>
+        <p14:creationId xmlns:p14="http://schemas.microsoft.com/office/powerpoint/2010/main" val="3780004549"/>
       </p:ext>
     </p:extLst>
   </p:cSld>
@@ -13450,8 +12659,87 @@
                 <a:spcPts val="600"/>
               </a:spcAft>
             </a:pPr>
-            <a:r>
-              <a:rPr lang="en-US" sz="4400" dirty="0">
+            <a:endParaRPr lang="en-US" sz="4400" dirty="0">
+              <a:solidFill>
+                <a:srgbClr val="1F2D29"/>
+              </a:solidFill>
+              <a:latin typeface="+mj-lt"/>
+              <a:ea typeface="+mj-ea"/>
+              <a:cs typeface="+mj-cs"/>
+            </a:endParaRPr>
+          </a:p>
+        </p:txBody>
+      </p:sp>
+      <p:pic>
+        <p:nvPicPr>
+          <p:cNvPr id="4" name="Picture 3" descr="Chart, scatter chart&#10;&#10;Description automatically generated">
+            <a:extLst>
+              <a:ext uri="{FF2B5EF4-FFF2-40B4-BE49-F238E27FC236}">
+                <a16:creationId xmlns:a16="http://schemas.microsoft.com/office/drawing/2014/main" id="{C37BD368-1443-EA45-87FD-9D4992F32339}"/>
+              </a:ext>
+            </a:extLst>
+          </p:cNvPr>
+          <p:cNvPicPr>
+            <a:picLocks noChangeAspect="1"/>
+          </p:cNvPicPr>
+          <p:nvPr/>
+        </p:nvPicPr>
+        <p:blipFill>
+          <a:blip r:embed="rId4"/>
+          <a:stretch>
+            <a:fillRect/>
+          </a:stretch>
+        </p:blipFill>
+        <p:spPr>
+          <a:xfrm>
+            <a:off x="3912124" y="3593776"/>
+            <a:ext cx="4799167" cy="3127576"/>
+          </a:xfrm>
+          <a:prstGeom prst="rect">
+            <a:avLst/>
+          </a:prstGeom>
+        </p:spPr>
+      </p:pic>
+      <p:sp>
+        <p:nvSpPr>
+          <p:cNvPr id="21" name="TextBox 20">
+            <a:extLst>
+              <a:ext uri="{FF2B5EF4-FFF2-40B4-BE49-F238E27FC236}">
+                <a16:creationId xmlns:a16="http://schemas.microsoft.com/office/drawing/2014/main" id="{D656FF7B-6D75-775F-F478-66D40DE0D620}"/>
+              </a:ext>
+            </a:extLst>
+          </p:cNvPr>
+          <p:cNvSpPr txBox="1"/>
+          <p:nvPr/>
+        </p:nvSpPr>
+        <p:spPr>
+          <a:xfrm>
+            <a:off x="2611808" y="384947"/>
+            <a:ext cx="7958331" cy="695739"/>
+          </a:xfrm>
+          <a:prstGeom prst="rect">
+            <a:avLst/>
+          </a:prstGeom>
+        </p:spPr>
+        <p:txBody>
+          <a:bodyPr vert="horz" lIns="91440" tIns="45720" rIns="91440" bIns="45720" rtlCol="0" anchor="b">
+            <a:normAutofit/>
+          </a:bodyPr>
+          <a:lstStyle/>
+          <a:p>
+            <a:pPr defTabSz="914400">
+              <a:lnSpc>
+                <a:spcPct val="90000"/>
+              </a:lnSpc>
+              <a:spcBef>
+                <a:spcPct val="0"/>
+              </a:spcBef>
+              <a:spcAft>
+                <a:spcPts val="600"/>
+              </a:spcAft>
+            </a:pPr>
+            <a:r>
+              <a:rPr lang="en-US" sz="4400" dirty="0" err="1">
                 <a:solidFill>
                   <a:srgbClr val="1F2D29"/>
                 </a:solidFill>
@@ -13459,17 +12747,25 @@
                 <a:ea typeface="+mj-ea"/>
                 <a:cs typeface="+mj-cs"/>
               </a:rPr>
-              <a:t>Machine Learning Predictions</a:t>
-            </a:r>
+              <a:t>Visualisations</a:t>
+            </a:r>
+            <a:endParaRPr lang="en-US" sz="4400" dirty="0">
+              <a:solidFill>
+                <a:srgbClr val="1F2D29"/>
+              </a:solidFill>
+              <a:latin typeface="+mj-lt"/>
+              <a:ea typeface="+mj-ea"/>
+              <a:cs typeface="+mj-cs"/>
+            </a:endParaRPr>
           </a:p>
         </p:txBody>
       </p:sp>
       <p:sp>
         <p:nvSpPr>
-          <p:cNvPr id="2" name="TextBox 1">
+          <p:cNvPr id="17" name="TextBox 16">
             <a:extLst>
               <a:ext uri="{FF2B5EF4-FFF2-40B4-BE49-F238E27FC236}">
-                <a16:creationId xmlns:a16="http://schemas.microsoft.com/office/drawing/2014/main" id="{EF8B4473-579C-464D-9A66-BBDB7E8B1CD6}"/>
+                <a16:creationId xmlns:a16="http://schemas.microsoft.com/office/drawing/2014/main" id="{71BDA58D-E815-2CD0-916D-EAFDDE2ED67C}"/>
               </a:ext>
             </a:extLst>
           </p:cNvPr>
@@ -13478,8 +12774,8 @@
         </p:nvSpPr>
         <p:spPr>
           <a:xfrm>
-            <a:off x="2448480" y="1295741"/>
-            <a:ext cx="8858985" cy="1892826"/>
+            <a:off x="2370973" y="1285452"/>
+            <a:ext cx="8858985" cy="2308324"/>
           </a:xfrm>
           <a:prstGeom prst="rect">
             <a:avLst/>
@@ -13492,76 +12788,70 @@
           </a:bodyPr>
           <a:lstStyle/>
           <a:p>
-            <a:pPr marL="285750" indent="-285750">
-              <a:buFont typeface="Arial" panose="020B0604020202020204" pitchFamily="34" charset="0"/>
-              <a:buChar char="•"/>
-            </a:pPr>
-            <a:r>
-              <a:rPr lang="en-AU" dirty="0">
+            <a:r>
+              <a:rPr lang="en-US" dirty="0">
                 <a:latin typeface="Calibri" panose="020F0502020204030204" pitchFamily="34" charset="0"/>
                 <a:cs typeface="Calibri" panose="020F0502020204030204" pitchFamily="34" charset="0"/>
               </a:rPr>
-              <a:t>For our machine learning aspect, we implemented confirmed covid cases, active cases, recovered cases and deaths as independent variables in order to predict the number of hospitalisations.</a:t>
-            </a:r>
-          </a:p>
-          <a:p>
-            <a:endParaRPr lang="en-AU" sz="900" dirty="0">
-              <a:latin typeface="Calibri" panose="020F0502020204030204" pitchFamily="34" charset="0"/>
-              <a:cs typeface="Calibri" panose="020F0502020204030204" pitchFamily="34" charset="0"/>
-            </a:endParaRPr>
-          </a:p>
-          <a:p>
-            <a:pPr marL="285750" indent="-285750">
-              <a:buFont typeface="Arial" panose="020B0604020202020204" pitchFamily="34" charset="0"/>
-              <a:buChar char="•"/>
+              <a:t>Additionally, we created another Flask app to generate three interactive visualizations:</a:t>
+            </a:r>
+          </a:p>
+          <a:p>
+            <a:pPr marL="342900" indent="-342900">
+              <a:buAutoNum type="arabicPeriod"/>
             </a:pPr>
             <a:r>
-              <a:rPr lang="en-AU" dirty="0">
+              <a:rPr lang="en-US" dirty="0">
                 <a:latin typeface="Calibri" panose="020F0502020204030204" pitchFamily="34" charset="0"/>
                 <a:cs typeface="Calibri" panose="020F0502020204030204" pitchFamily="34" charset="0"/>
               </a:rPr>
-              <a:t>Python was used to develop a polynomial regression model and fit it to our COVID data. The python module ‘Pickle’ was used to save the model and run it with a Flask app in order to create this forecasting tool with HTML.</a:t>
-            </a:r>
-            <a:endParaRPr lang="en-US" dirty="0">
-              <a:latin typeface="Calibri" panose="020F0502020204030204" pitchFamily="34" charset="0"/>
-              <a:cs typeface="Calibri" panose="020F0502020204030204" pitchFamily="34" charset="0"/>
-            </a:endParaRPr>
+              <a:t>A bubble chart representing confirmed cases and deaths against fully vaccinated, boosted, and unvaccinated populations for each country.</a:t>
+            </a:r>
+          </a:p>
+          <a:p>
+            <a:pPr marL="342900" indent="-342900">
+              <a:buAutoNum type="arabicPeriod"/>
+            </a:pPr>
+            <a:r>
+              <a:rPr lang="en-US" dirty="0">
+                <a:latin typeface="Calibri" panose="020F0502020204030204" pitchFamily="34" charset="0"/>
+                <a:cs typeface="Calibri" panose="020F0502020204030204" pitchFamily="34" charset="0"/>
+              </a:rPr>
+              <a:t>A bar chart representing the 5 countries with the highest number of confirmed cases as of the date of the last database update, May 1 2022.</a:t>
+            </a:r>
+          </a:p>
+          <a:p>
+            <a:pPr marL="342900" indent="-342900">
+              <a:buAutoNum type="arabicPeriod"/>
+            </a:pPr>
+            <a:r>
+              <a:rPr lang="en-US" dirty="0">
+                <a:latin typeface="Calibri" panose="020F0502020204030204" pitchFamily="34" charset="0"/>
+                <a:cs typeface="Calibri" panose="020F0502020204030204" pitchFamily="34" charset="0"/>
+              </a:rPr>
+              <a:t>Three scatter plots representing the number of confirmed cases, deaths and </a:t>
+            </a:r>
+            <a:r>
+              <a:rPr lang="en-US" dirty="0" err="1">
+                <a:latin typeface="Calibri" panose="020F0502020204030204" pitchFamily="34" charset="0"/>
+                <a:cs typeface="Calibri" panose="020F0502020204030204" pitchFamily="34" charset="0"/>
+              </a:rPr>
+              <a:t>hospitalisations</a:t>
+            </a:r>
+            <a:r>
+              <a:rPr lang="en-US" dirty="0">
+                <a:latin typeface="Calibri" panose="020F0502020204030204" pitchFamily="34" charset="0"/>
+                <a:cs typeface="Calibri" panose="020F0502020204030204" pitchFamily="34" charset="0"/>
+              </a:rPr>
+              <a:t> over time for any country of the user’s choice, which can be selected using a dropdown list.</a:t>
+            </a:r>
           </a:p>
         </p:txBody>
       </p:sp>
-      <p:pic>
-        <p:nvPicPr>
-          <p:cNvPr id="15" name="Picture 14" descr="Graphical user interface, text, application, email&#10;&#10;Description automatically generated">
-            <a:extLst>
-              <a:ext uri="{FF2B5EF4-FFF2-40B4-BE49-F238E27FC236}">
-                <a16:creationId xmlns:a16="http://schemas.microsoft.com/office/drawing/2014/main" id="{BB514D89-56E0-6AA9-8B1C-467E5496186E}"/>
-              </a:ext>
-            </a:extLst>
-          </p:cNvPr>
-          <p:cNvPicPr>
-            <a:picLocks noChangeAspect="1"/>
-          </p:cNvPicPr>
-          <p:nvPr/>
-        </p:nvPicPr>
-        <p:blipFill rotWithShape="1">
-          <a:blip r:embed="rId4"/>
-          <a:srcRect t="138"/>
-          <a:stretch/>
-        </p:blipFill>
-        <p:spPr>
-          <a:xfrm>
-            <a:off x="3745062" y="3327066"/>
-            <a:ext cx="5529105" cy="3361386"/>
-          </a:xfrm>
-          <a:prstGeom prst="rect">
-            <a:avLst/>
-          </a:prstGeom>
-        </p:spPr>
-      </p:pic>
     </p:spTree>
     <p:extLst>
       <p:ext uri="{BB962C8B-B14F-4D97-AF65-F5344CB8AC3E}">
-        <p14:creationId xmlns:p14="http://schemas.microsoft.com/office/powerpoint/2010/main" val="3780004549"/>
+        <p14:creationId xmlns:p14="http://schemas.microsoft.com/office/powerpoint/2010/main" val="2334512959"/>
       </p:ext>
     </p:extLst>
   </p:cSld>
@@ -14202,10 +13492,200 @@
       </p:pic>
       <p:sp>
         <p:nvSpPr>
-          <p:cNvPr id="8" name="TextBox 7">
+          <p:cNvPr id="20" name="TextBox 19">
             <a:extLst>
               <a:ext uri="{FF2B5EF4-FFF2-40B4-BE49-F238E27FC236}">
-                <a16:creationId xmlns:a16="http://schemas.microsoft.com/office/drawing/2014/main" id="{0914A32B-0DA5-0F4C-9F00-864FDB33A88B}"/>
+                <a16:creationId xmlns:a16="http://schemas.microsoft.com/office/drawing/2014/main" id="{3634E5B9-9DFE-BDBC-3F49-B571B51A0D63}"/>
+              </a:ext>
+            </a:extLst>
+          </p:cNvPr>
+          <p:cNvSpPr txBox="1"/>
+          <p:nvPr/>
+        </p:nvSpPr>
+        <p:spPr>
+          <a:xfrm>
+            <a:off x="2788207" y="1541807"/>
+            <a:ext cx="7370206" cy="4595682"/>
+          </a:xfrm>
+          <a:prstGeom prst="rect">
+            <a:avLst/>
+          </a:prstGeom>
+          <a:noFill/>
+        </p:spPr>
+        <p:txBody>
+          <a:bodyPr wrap="square">
+            <a:spAutoFit/>
+          </a:bodyPr>
+          <a:lstStyle/>
+          <a:p>
+            <a:pPr marL="171450" indent="-171450">
+              <a:buFont typeface="Wingdings" panose="05000000000000000000" pitchFamily="2" charset="2"/>
+              <a:buChar char="Ø"/>
+            </a:pPr>
+            <a:r>
+              <a:rPr lang="en-US" sz="1600" b="1" dirty="0">
+                <a:latin typeface="Calibri" panose="020F0502020204030204" pitchFamily="34" charset="0"/>
+                <a:cs typeface="Calibri" panose="020F0502020204030204" pitchFamily="34" charset="0"/>
+              </a:rPr>
+              <a:t>Extracting the Data</a:t>
+            </a:r>
+          </a:p>
+          <a:p>
+            <a:r>
+              <a:rPr lang="en-US" sz="1600" dirty="0">
+                <a:latin typeface="Calibri" panose="020F0502020204030204" pitchFamily="34" charset="0"/>
+                <a:cs typeface="Calibri" panose="020F0502020204030204" pitchFamily="34" charset="0"/>
+              </a:rPr>
+              <a:t>The Extract phase  uses urls / wget downloads in place of API calls are APIs are not available for the datasets needed. The JHU time series data sets were retrieved using this method.</a:t>
+            </a:r>
+          </a:p>
+          <a:p>
+            <a:endParaRPr lang="en-US" sz="1600" dirty="0">
+              <a:latin typeface="Calibri" panose="020F0502020204030204" pitchFamily="34" charset="0"/>
+              <a:cs typeface="Calibri" panose="020F0502020204030204" pitchFamily="34" charset="0"/>
+            </a:endParaRPr>
+          </a:p>
+          <a:p>
+            <a:pPr marL="171450" indent="-171450">
+              <a:buFont typeface="Wingdings" panose="05000000000000000000" pitchFamily="2" charset="2"/>
+              <a:buChar char="Ø"/>
+            </a:pPr>
+            <a:r>
+              <a:rPr lang="en-US" sz="1600" b="1" dirty="0">
+                <a:latin typeface="Calibri" panose="020F0502020204030204" pitchFamily="34" charset="0"/>
+                <a:cs typeface="Calibri" panose="020F0502020204030204" pitchFamily="34" charset="0"/>
+              </a:rPr>
+              <a:t>Transforming the Data</a:t>
+            </a:r>
+          </a:p>
+          <a:p>
+            <a:r>
+              <a:rPr lang="en-US" sz="1600" dirty="0">
+                <a:latin typeface="Calibri" panose="020F0502020204030204" pitchFamily="34" charset="0"/>
+                <a:cs typeface="Calibri" panose="020F0502020204030204" pitchFamily="34" charset="0"/>
+              </a:rPr>
+              <a:t>The detailed description of the Data Transformation is covered in the end of this section. It covers both data cleansing and data transformation and does the typical:</a:t>
+            </a:r>
+          </a:p>
+          <a:p>
+            <a:pPr marL="489600" lvl="1" indent="-285750">
+              <a:buFont typeface="Arial" panose="020B0604020202020204" pitchFamily="34" charset="0"/>
+              <a:buChar char="•"/>
+            </a:pPr>
+            <a:r>
+              <a:rPr lang="en-US" sz="1600" dirty="0">
+                <a:latin typeface="Calibri" panose="020F0502020204030204" pitchFamily="34" charset="0"/>
+                <a:cs typeface="Calibri" panose="020F0502020204030204" pitchFamily="34" charset="0"/>
+              </a:rPr>
+              <a:t>removing unwanted or duplicate data</a:t>
+            </a:r>
+          </a:p>
+          <a:p>
+            <a:pPr marL="489600" lvl="1" indent="-285750">
+              <a:buFont typeface="Arial" panose="020B0604020202020204" pitchFamily="34" charset="0"/>
+              <a:buChar char="•"/>
+            </a:pPr>
+            <a:r>
+              <a:rPr lang="en-US" sz="1600" dirty="0">
+                <a:latin typeface="Calibri" panose="020F0502020204030204" pitchFamily="34" charset="0"/>
+                <a:cs typeface="Calibri" panose="020F0502020204030204" pitchFamily="34" charset="0"/>
+              </a:rPr>
+              <a:t>fixing structural issues</a:t>
+            </a:r>
+          </a:p>
+          <a:p>
+            <a:pPr marL="489600" lvl="1" indent="-285750">
+              <a:buFont typeface="Arial" panose="020B0604020202020204" pitchFamily="34" charset="0"/>
+              <a:buChar char="•"/>
+            </a:pPr>
+            <a:r>
+              <a:rPr lang="en-US" sz="1600" dirty="0">
+                <a:latin typeface="Calibri" panose="020F0502020204030204" pitchFamily="34" charset="0"/>
+                <a:cs typeface="Calibri" panose="020F0502020204030204" pitchFamily="34" charset="0"/>
+              </a:rPr>
+              <a:t>handling missing data</a:t>
+            </a:r>
+          </a:p>
+          <a:p>
+            <a:pPr marL="489600" lvl="1" indent="-285750">
+              <a:buFont typeface="Arial" panose="020B0604020202020204" pitchFamily="34" charset="0"/>
+              <a:buChar char="•"/>
+            </a:pPr>
+            <a:r>
+              <a:rPr lang="en-US" sz="1600" dirty="0">
+                <a:latin typeface="Calibri" panose="020F0502020204030204" pitchFamily="34" charset="0"/>
+                <a:cs typeface="Calibri" panose="020F0502020204030204" pitchFamily="34" charset="0"/>
+              </a:rPr>
+              <a:t>removing outliers</a:t>
+            </a:r>
+          </a:p>
+          <a:p>
+            <a:pPr marL="489600" lvl="1" indent="-285750">
+              <a:buFont typeface="Arial" panose="020B0604020202020204" pitchFamily="34" charset="0"/>
+              <a:buChar char="•"/>
+            </a:pPr>
+            <a:r>
+              <a:rPr lang="en-US" sz="1600" dirty="0">
+                <a:latin typeface="Calibri" panose="020F0502020204030204" pitchFamily="34" charset="0"/>
+                <a:cs typeface="Calibri" panose="020F0502020204030204" pitchFamily="34" charset="0"/>
+              </a:rPr>
+              <a:t>providing a quality assurance check on the data prior to regression analysis.</a:t>
+            </a:r>
+          </a:p>
+          <a:p>
+            <a:pPr lvl="1"/>
+            <a:endParaRPr lang="en-US" sz="1600" dirty="0">
+              <a:latin typeface="Calibri" panose="020F0502020204030204" pitchFamily="34" charset="0"/>
+              <a:cs typeface="Calibri" panose="020F0502020204030204" pitchFamily="34" charset="0"/>
+            </a:endParaRPr>
+          </a:p>
+          <a:p>
+            <a:pPr marL="171450" indent="-171450">
+              <a:buFont typeface="Wingdings" panose="05000000000000000000" pitchFamily="2" charset="2"/>
+              <a:buChar char="Ø"/>
+            </a:pPr>
+            <a:r>
+              <a:rPr lang="en-US" sz="1600" b="1" dirty="0">
+                <a:latin typeface="Calibri" panose="020F0502020204030204" pitchFamily="34" charset="0"/>
+                <a:cs typeface="Calibri" panose="020F0502020204030204" pitchFamily="34" charset="0"/>
+              </a:rPr>
+              <a:t>Loading the Data</a:t>
+            </a:r>
+          </a:p>
+          <a:p>
+            <a:r>
+              <a:rPr lang="en-US" sz="1600" dirty="0">
+                <a:latin typeface="Calibri" panose="020F0502020204030204" pitchFamily="34" charset="0"/>
+                <a:cs typeface="Calibri" panose="020F0502020204030204" pitchFamily="34" charset="0"/>
+              </a:rPr>
+              <a:t>Use Python-Pandas as the server-side language and Loaded five data frames to PostGreSQL database tables</a:t>
+            </a:r>
+            <a:endParaRPr lang="en-US" sz="1400" dirty="0">
+              <a:latin typeface="Calibri" panose="020F0502020204030204" pitchFamily="34" charset="0"/>
+              <a:cs typeface="Calibri" panose="020F0502020204030204" pitchFamily="34" charset="0"/>
+            </a:endParaRPr>
+          </a:p>
+          <a:p>
+            <a:pPr marL="171450" indent="-171450">
+              <a:lnSpc>
+                <a:spcPct val="200000"/>
+              </a:lnSpc>
+              <a:buFont typeface="Wingdings" panose="05000000000000000000" pitchFamily="2" charset="2"/>
+              <a:buChar char="Ø"/>
+            </a:pPr>
+            <a:endParaRPr lang="en-US" sz="1200" dirty="0">
+              <a:latin typeface="Calibri" panose="020F0502020204030204" pitchFamily="34" charset="0"/>
+              <a:cs typeface="Calibri" panose="020F0502020204030204" pitchFamily="34" charset="0"/>
+            </a:endParaRPr>
+          </a:p>
+        </p:txBody>
+      </p:sp>
+      <p:sp>
+        <p:nvSpPr>
+          <p:cNvPr id="15" name="TextBox 14">
+            <a:extLst>
+              <a:ext uri="{FF2B5EF4-FFF2-40B4-BE49-F238E27FC236}">
+                <a16:creationId xmlns:a16="http://schemas.microsoft.com/office/drawing/2014/main" id="{466F6DA1-7E1B-370A-A23D-19A883090D44}"/>
               </a:ext>
             </a:extLst>
           </p:cNvPr>
@@ -14238,177 +13718,14 @@
                 <a:spcPts val="600"/>
               </a:spcAft>
             </a:pPr>
-            <a:endParaRPr lang="en-US" sz="4400" dirty="0">
-              <a:solidFill>
-                <a:srgbClr val="1F2D29"/>
-              </a:solidFill>
-              <a:latin typeface="+mj-lt"/>
-              <a:ea typeface="+mj-ea"/>
-              <a:cs typeface="+mj-cs"/>
-            </a:endParaRPr>
-          </a:p>
-        </p:txBody>
-      </p:sp>
-      <p:pic>
-        <p:nvPicPr>
-          <p:cNvPr id="4" name="Picture 3" descr="Chart, scatter chart&#10;&#10;Description automatically generated">
-            <a:extLst>
-              <a:ext uri="{FF2B5EF4-FFF2-40B4-BE49-F238E27FC236}">
-                <a16:creationId xmlns:a16="http://schemas.microsoft.com/office/drawing/2014/main" id="{C37BD368-1443-EA45-87FD-9D4992F32339}"/>
-              </a:ext>
-            </a:extLst>
-          </p:cNvPr>
-          <p:cNvPicPr>
-            <a:picLocks noChangeAspect="1"/>
-          </p:cNvPicPr>
-          <p:nvPr/>
-        </p:nvPicPr>
-        <p:blipFill>
-          <a:blip r:embed="rId4"/>
-          <a:stretch>
-            <a:fillRect/>
-          </a:stretch>
-        </p:blipFill>
-        <p:spPr>
-          <a:xfrm>
-            <a:off x="3840038" y="3511728"/>
-            <a:ext cx="4871253" cy="3174554"/>
-          </a:xfrm>
-          <a:prstGeom prst="rect">
-            <a:avLst/>
-          </a:prstGeom>
-        </p:spPr>
-      </p:pic>
-      <p:sp>
-        <p:nvSpPr>
-          <p:cNvPr id="21" name="TextBox 20">
-            <a:extLst>
-              <a:ext uri="{FF2B5EF4-FFF2-40B4-BE49-F238E27FC236}">
-                <a16:creationId xmlns:a16="http://schemas.microsoft.com/office/drawing/2014/main" id="{D656FF7B-6D75-775F-F478-66D40DE0D620}"/>
-              </a:ext>
-            </a:extLst>
-          </p:cNvPr>
-          <p:cNvSpPr txBox="1"/>
-          <p:nvPr/>
-        </p:nvSpPr>
-        <p:spPr>
-          <a:xfrm>
-            <a:off x="2611808" y="384947"/>
-            <a:ext cx="7958331" cy="695739"/>
-          </a:xfrm>
-          <a:prstGeom prst="rect">
-            <a:avLst/>
-          </a:prstGeom>
-        </p:spPr>
-        <p:txBody>
-          <a:bodyPr vert="horz" lIns="91440" tIns="45720" rIns="91440" bIns="45720" rtlCol="0" anchor="b">
-            <a:normAutofit/>
-          </a:bodyPr>
-          <a:lstStyle/>
-          <a:p>
-            <a:pPr defTabSz="914400">
-              <a:lnSpc>
-                <a:spcPct val="90000"/>
-              </a:lnSpc>
-              <a:spcBef>
-                <a:spcPct val="0"/>
-              </a:spcBef>
-              <a:spcAft>
-                <a:spcPts val="600"/>
-              </a:spcAft>
-            </a:pPr>
-            <a:r>
-              <a:rPr lang="en-US" sz="4400" dirty="0" err="1">
+            <a:r>
+              <a:rPr lang="en-US" sz="4400" dirty="0">
                 <a:solidFill>
                   <a:srgbClr val="1F2D29"/>
                 </a:solidFill>
-                <a:latin typeface="+mj-lt"/>
-                <a:ea typeface="+mj-ea"/>
-                <a:cs typeface="+mj-cs"/>
-              </a:rPr>
-              <a:t>Visualisations</a:t>
-            </a:r>
-            <a:endParaRPr lang="en-US" sz="4400" dirty="0">
-              <a:solidFill>
-                <a:srgbClr val="1F2D29"/>
-              </a:solidFill>
-              <a:latin typeface="+mj-lt"/>
-              <a:ea typeface="+mj-ea"/>
-              <a:cs typeface="+mj-cs"/>
-            </a:endParaRPr>
-          </a:p>
-        </p:txBody>
-      </p:sp>
-      <p:sp>
-        <p:nvSpPr>
-          <p:cNvPr id="17" name="TextBox 16">
-            <a:extLst>
-              <a:ext uri="{FF2B5EF4-FFF2-40B4-BE49-F238E27FC236}">
-                <a16:creationId xmlns:a16="http://schemas.microsoft.com/office/drawing/2014/main" id="{71BDA58D-E815-2CD0-916D-EAFDDE2ED67C}"/>
-              </a:ext>
-            </a:extLst>
-          </p:cNvPr>
-          <p:cNvSpPr txBox="1"/>
-          <p:nvPr/>
-        </p:nvSpPr>
-        <p:spPr>
-          <a:xfrm>
-            <a:off x="2370973" y="1285452"/>
-            <a:ext cx="8858985" cy="2031325"/>
-          </a:xfrm>
-          <a:prstGeom prst="rect">
-            <a:avLst/>
-          </a:prstGeom>
-          <a:noFill/>
-        </p:spPr>
-        <p:txBody>
-          <a:bodyPr wrap="square" rtlCol="0">
-            <a:spAutoFit/>
-          </a:bodyPr>
-          <a:lstStyle/>
-          <a:p>
-            <a:r>
-              <a:rPr lang="en-US" dirty="0">
-                <a:latin typeface="Calibri" panose="020F0502020204030204" pitchFamily="34" charset="0"/>
                 <a:cs typeface="Calibri" panose="020F0502020204030204" pitchFamily="34" charset="0"/>
               </a:rPr>
-              <a:t>Additionally, we created another Flask app to generate three interactive visualizations:</a:t>
-            </a:r>
-          </a:p>
-          <a:p>
-            <a:pPr marL="342900" indent="-342900">
-              <a:buAutoNum type="arabicPeriod"/>
-            </a:pPr>
-            <a:r>
-              <a:rPr lang="en-US" dirty="0">
-                <a:latin typeface="Calibri" panose="020F0502020204030204" pitchFamily="34" charset="0"/>
-                <a:cs typeface="Calibri" panose="020F0502020204030204" pitchFamily="34" charset="0"/>
-              </a:rPr>
-              <a:t>A bubble chart representing confirmed cases and deaths against fully vaccinated, boosted, and unvaccinated populations for each country.</a:t>
-            </a:r>
-          </a:p>
-          <a:p>
-            <a:pPr marL="342900" indent="-342900">
-              <a:buAutoNum type="arabicPeriod"/>
-            </a:pPr>
-            <a:r>
-              <a:rPr lang="en-US" dirty="0">
-                <a:latin typeface="Calibri" panose="020F0502020204030204" pitchFamily="34" charset="0"/>
-                <a:cs typeface="Calibri" panose="020F0502020204030204" pitchFamily="34" charset="0"/>
-              </a:rPr>
-              <a:t>A bar chart representing the 10 countries with the highest number of confirmed cases as of the date of the last database update, March 15 2022.</a:t>
-            </a:r>
-          </a:p>
-          <a:p>
-            <a:pPr marL="342900" indent="-342900">
-              <a:buAutoNum type="arabicPeriod"/>
-            </a:pPr>
-            <a:r>
-              <a:rPr lang="en-US" dirty="0">
-                <a:latin typeface="Calibri" panose="020F0502020204030204" pitchFamily="34" charset="0"/>
-                <a:cs typeface="Calibri" panose="020F0502020204030204" pitchFamily="34" charset="0"/>
-              </a:rPr>
-              <a:t>Two scatter plots representing the number of confirmed cases and deaths over time for any country of the user’s choice, which can be selected using a dropdown list.</a:t>
+              <a:t>ETL process</a:t>
             </a:r>
           </a:p>
         </p:txBody>
@@ -14416,7 +13733,7 @@
     </p:spTree>
     <p:extLst>
       <p:ext uri="{BB962C8B-B14F-4D97-AF65-F5344CB8AC3E}">
-        <p14:creationId xmlns:p14="http://schemas.microsoft.com/office/powerpoint/2010/main" val="2334512959"/>
+        <p14:creationId xmlns:p14="http://schemas.microsoft.com/office/powerpoint/2010/main" val="2248352843"/>
       </p:ext>
     </p:extLst>
   </p:cSld>
@@ -15057,200 +14374,10 @@
       </p:pic>
       <p:sp>
         <p:nvSpPr>
-          <p:cNvPr id="20" name="TextBox 19">
+          <p:cNvPr id="8" name="TextBox 7">
             <a:extLst>
               <a:ext uri="{FF2B5EF4-FFF2-40B4-BE49-F238E27FC236}">
-                <a16:creationId xmlns:a16="http://schemas.microsoft.com/office/drawing/2014/main" id="{3634E5B9-9DFE-BDBC-3F49-B571B51A0D63}"/>
-              </a:ext>
-            </a:extLst>
-          </p:cNvPr>
-          <p:cNvSpPr txBox="1"/>
-          <p:nvPr/>
-        </p:nvSpPr>
-        <p:spPr>
-          <a:xfrm>
-            <a:off x="2788207" y="1541807"/>
-            <a:ext cx="7370206" cy="4595682"/>
-          </a:xfrm>
-          <a:prstGeom prst="rect">
-            <a:avLst/>
-          </a:prstGeom>
-          <a:noFill/>
-        </p:spPr>
-        <p:txBody>
-          <a:bodyPr wrap="square">
-            <a:spAutoFit/>
-          </a:bodyPr>
-          <a:lstStyle/>
-          <a:p>
-            <a:pPr marL="171450" indent="-171450">
-              <a:buFont typeface="Wingdings" panose="05000000000000000000" pitchFamily="2" charset="2"/>
-              <a:buChar char="Ø"/>
-            </a:pPr>
-            <a:r>
-              <a:rPr lang="en-US" sz="1600" b="1" dirty="0">
-                <a:latin typeface="Calibri" panose="020F0502020204030204" pitchFamily="34" charset="0"/>
-                <a:cs typeface="Calibri" panose="020F0502020204030204" pitchFamily="34" charset="0"/>
-              </a:rPr>
-              <a:t>Extracting the Data</a:t>
-            </a:r>
-          </a:p>
-          <a:p>
-            <a:r>
-              <a:rPr lang="en-US" sz="1600" dirty="0">
-                <a:latin typeface="Calibri" panose="020F0502020204030204" pitchFamily="34" charset="0"/>
-                <a:cs typeface="Calibri" panose="020F0502020204030204" pitchFamily="34" charset="0"/>
-              </a:rPr>
-              <a:t>The Extract phase  uses urls / wget downloads in place of API calls are APIs are not available for the datasets needed. The JHU time series data sets were retrieved using this method.</a:t>
-            </a:r>
-          </a:p>
-          <a:p>
-            <a:endParaRPr lang="en-US" sz="1600" dirty="0">
-              <a:latin typeface="Calibri" panose="020F0502020204030204" pitchFamily="34" charset="0"/>
-              <a:cs typeface="Calibri" panose="020F0502020204030204" pitchFamily="34" charset="0"/>
-            </a:endParaRPr>
-          </a:p>
-          <a:p>
-            <a:pPr marL="171450" indent="-171450">
-              <a:buFont typeface="Wingdings" panose="05000000000000000000" pitchFamily="2" charset="2"/>
-              <a:buChar char="Ø"/>
-            </a:pPr>
-            <a:r>
-              <a:rPr lang="en-US" sz="1600" b="1" dirty="0">
-                <a:latin typeface="Calibri" panose="020F0502020204030204" pitchFamily="34" charset="0"/>
-                <a:cs typeface="Calibri" panose="020F0502020204030204" pitchFamily="34" charset="0"/>
-              </a:rPr>
-              <a:t>Transforming the Data</a:t>
-            </a:r>
-          </a:p>
-          <a:p>
-            <a:r>
-              <a:rPr lang="en-US" sz="1600" dirty="0">
-                <a:latin typeface="Calibri" panose="020F0502020204030204" pitchFamily="34" charset="0"/>
-                <a:cs typeface="Calibri" panose="020F0502020204030204" pitchFamily="34" charset="0"/>
-              </a:rPr>
-              <a:t>The detailed description of the Data Transformation is covered in the end of this section. It covers both data cleansing and data transformation and does the typical:</a:t>
-            </a:r>
-          </a:p>
-          <a:p>
-            <a:pPr marL="489600" lvl="1" indent="-285750">
-              <a:buFont typeface="Arial" panose="020B0604020202020204" pitchFamily="34" charset="0"/>
-              <a:buChar char="•"/>
-            </a:pPr>
-            <a:r>
-              <a:rPr lang="en-US" sz="1600" dirty="0">
-                <a:latin typeface="Calibri" panose="020F0502020204030204" pitchFamily="34" charset="0"/>
-                <a:cs typeface="Calibri" panose="020F0502020204030204" pitchFamily="34" charset="0"/>
-              </a:rPr>
-              <a:t>removing unwanted or duplicate data</a:t>
-            </a:r>
-          </a:p>
-          <a:p>
-            <a:pPr marL="489600" lvl="1" indent="-285750">
-              <a:buFont typeface="Arial" panose="020B0604020202020204" pitchFamily="34" charset="0"/>
-              <a:buChar char="•"/>
-            </a:pPr>
-            <a:r>
-              <a:rPr lang="en-US" sz="1600" dirty="0">
-                <a:latin typeface="Calibri" panose="020F0502020204030204" pitchFamily="34" charset="0"/>
-                <a:cs typeface="Calibri" panose="020F0502020204030204" pitchFamily="34" charset="0"/>
-              </a:rPr>
-              <a:t>fixing structural issues</a:t>
-            </a:r>
-          </a:p>
-          <a:p>
-            <a:pPr marL="489600" lvl="1" indent="-285750">
-              <a:buFont typeface="Arial" panose="020B0604020202020204" pitchFamily="34" charset="0"/>
-              <a:buChar char="•"/>
-            </a:pPr>
-            <a:r>
-              <a:rPr lang="en-US" sz="1600" dirty="0">
-                <a:latin typeface="Calibri" panose="020F0502020204030204" pitchFamily="34" charset="0"/>
-                <a:cs typeface="Calibri" panose="020F0502020204030204" pitchFamily="34" charset="0"/>
-              </a:rPr>
-              <a:t>handling missing data</a:t>
-            </a:r>
-          </a:p>
-          <a:p>
-            <a:pPr marL="489600" lvl="1" indent="-285750">
-              <a:buFont typeface="Arial" panose="020B0604020202020204" pitchFamily="34" charset="0"/>
-              <a:buChar char="•"/>
-            </a:pPr>
-            <a:r>
-              <a:rPr lang="en-US" sz="1600" dirty="0">
-                <a:latin typeface="Calibri" panose="020F0502020204030204" pitchFamily="34" charset="0"/>
-                <a:cs typeface="Calibri" panose="020F0502020204030204" pitchFamily="34" charset="0"/>
-              </a:rPr>
-              <a:t>removing outliers</a:t>
-            </a:r>
-          </a:p>
-          <a:p>
-            <a:pPr marL="489600" lvl="1" indent="-285750">
-              <a:buFont typeface="Arial" panose="020B0604020202020204" pitchFamily="34" charset="0"/>
-              <a:buChar char="•"/>
-            </a:pPr>
-            <a:r>
-              <a:rPr lang="en-US" sz="1600" dirty="0">
-                <a:latin typeface="Calibri" panose="020F0502020204030204" pitchFamily="34" charset="0"/>
-                <a:cs typeface="Calibri" panose="020F0502020204030204" pitchFamily="34" charset="0"/>
-              </a:rPr>
-              <a:t>providing a quality assurance check on the data prior to regression analysis.</a:t>
-            </a:r>
-          </a:p>
-          <a:p>
-            <a:pPr lvl="1"/>
-            <a:endParaRPr lang="en-US" sz="1600" dirty="0">
-              <a:latin typeface="Calibri" panose="020F0502020204030204" pitchFamily="34" charset="0"/>
-              <a:cs typeface="Calibri" panose="020F0502020204030204" pitchFamily="34" charset="0"/>
-            </a:endParaRPr>
-          </a:p>
-          <a:p>
-            <a:pPr marL="171450" indent="-171450">
-              <a:buFont typeface="Wingdings" panose="05000000000000000000" pitchFamily="2" charset="2"/>
-              <a:buChar char="Ø"/>
-            </a:pPr>
-            <a:r>
-              <a:rPr lang="en-US" sz="1600" b="1" dirty="0">
-                <a:latin typeface="Calibri" panose="020F0502020204030204" pitchFamily="34" charset="0"/>
-                <a:cs typeface="Calibri" panose="020F0502020204030204" pitchFamily="34" charset="0"/>
-              </a:rPr>
-              <a:t>Loading the Data</a:t>
-            </a:r>
-          </a:p>
-          <a:p>
-            <a:r>
-              <a:rPr lang="en-US" sz="1600" dirty="0">
-                <a:latin typeface="Calibri" panose="020F0502020204030204" pitchFamily="34" charset="0"/>
-                <a:cs typeface="Calibri" panose="020F0502020204030204" pitchFamily="34" charset="0"/>
-              </a:rPr>
-              <a:t>Use Python-Pandas as the server-side language and Loaded five data frames to PostGreSQL database tables</a:t>
-            </a:r>
-            <a:endParaRPr lang="en-US" sz="1400" dirty="0">
-              <a:latin typeface="Calibri" panose="020F0502020204030204" pitchFamily="34" charset="0"/>
-              <a:cs typeface="Calibri" panose="020F0502020204030204" pitchFamily="34" charset="0"/>
-            </a:endParaRPr>
-          </a:p>
-          <a:p>
-            <a:pPr marL="171450" indent="-171450">
-              <a:lnSpc>
-                <a:spcPct val="200000"/>
-              </a:lnSpc>
-              <a:buFont typeface="Wingdings" panose="05000000000000000000" pitchFamily="2" charset="2"/>
-              <a:buChar char="Ø"/>
-            </a:pPr>
-            <a:endParaRPr lang="en-US" sz="1200" dirty="0">
-              <a:latin typeface="Calibri" panose="020F0502020204030204" pitchFamily="34" charset="0"/>
-              <a:cs typeface="Calibri" panose="020F0502020204030204" pitchFamily="34" charset="0"/>
-            </a:endParaRPr>
-          </a:p>
-        </p:txBody>
-      </p:sp>
-      <p:sp>
-        <p:nvSpPr>
-          <p:cNvPr id="15" name="TextBox 14">
-            <a:extLst>
-              <a:ext uri="{FF2B5EF4-FFF2-40B4-BE49-F238E27FC236}">
-                <a16:creationId xmlns:a16="http://schemas.microsoft.com/office/drawing/2014/main" id="{466F6DA1-7E1B-370A-A23D-19A883090D44}"/>
+                <a16:creationId xmlns:a16="http://schemas.microsoft.com/office/drawing/2014/main" id="{0914A32B-0DA5-0F4C-9F00-864FDB33A88B}"/>
               </a:ext>
             </a:extLst>
           </p:cNvPr>
@@ -15288,17 +14415,79 @@
                 <a:solidFill>
                   <a:srgbClr val="1F2D29"/>
                 </a:solidFill>
-                <a:cs typeface="Calibri" panose="020F0502020204030204" pitchFamily="34" charset="0"/>
-              </a:rPr>
-              <a:t>ETL process</a:t>
+                <a:latin typeface="+mj-lt"/>
+                <a:ea typeface="+mj-ea"/>
+                <a:cs typeface="+mj-cs"/>
+              </a:rPr>
+              <a:t>COVID-19 Database</a:t>
             </a:r>
           </a:p>
         </p:txBody>
       </p:sp>
+      <p:pic>
+        <p:nvPicPr>
+          <p:cNvPr id="15" name="Picture 14">
+            <a:extLst>
+              <a:ext uri="{FF2B5EF4-FFF2-40B4-BE49-F238E27FC236}">
+                <a16:creationId xmlns:a16="http://schemas.microsoft.com/office/drawing/2014/main" id="{A1342298-5A6D-AB68-DAF1-B9E9F75657C1}"/>
+              </a:ext>
+            </a:extLst>
+          </p:cNvPr>
+          <p:cNvPicPr>
+            <a:picLocks noChangeAspect="1"/>
+          </p:cNvPicPr>
+          <p:nvPr/>
+        </p:nvPicPr>
+        <p:blipFill>
+          <a:blip r:embed="rId4"/>
+          <a:stretch>
+            <a:fillRect/>
+          </a:stretch>
+        </p:blipFill>
+        <p:spPr>
+          <a:xfrm>
+            <a:off x="9206967" y="1652303"/>
+            <a:ext cx="2242716" cy="4374996"/>
+          </a:xfrm>
+          <a:prstGeom prst="rect">
+            <a:avLst/>
+          </a:prstGeom>
+        </p:spPr>
+      </p:pic>
+      <p:pic>
+        <p:nvPicPr>
+          <p:cNvPr id="4" name="Picture 3" descr="Graphical user interface, application&#10;&#10;Description automatically generated">
+            <a:extLst>
+              <a:ext uri="{FF2B5EF4-FFF2-40B4-BE49-F238E27FC236}">
+                <a16:creationId xmlns:a16="http://schemas.microsoft.com/office/drawing/2014/main" id="{E837D942-C0A5-B51C-A3AE-54A5D1D77D45}"/>
+              </a:ext>
+            </a:extLst>
+          </p:cNvPr>
+          <p:cNvPicPr>
+            <a:picLocks noChangeAspect="1"/>
+          </p:cNvPicPr>
+          <p:nvPr/>
+        </p:nvPicPr>
+        <p:blipFill>
+          <a:blip r:embed="rId5"/>
+          <a:stretch>
+            <a:fillRect/>
+          </a:stretch>
+        </p:blipFill>
+        <p:spPr>
+          <a:xfrm>
+            <a:off x="2025860" y="1939771"/>
+            <a:ext cx="6977697" cy="3800060"/>
+          </a:xfrm>
+          <a:prstGeom prst="flowChartPunchedCard">
+            <a:avLst/>
+          </a:prstGeom>
+        </p:spPr>
+      </p:pic>
     </p:spTree>
     <p:extLst>
       <p:ext uri="{BB962C8B-B14F-4D97-AF65-F5344CB8AC3E}">
-        <p14:creationId xmlns:p14="http://schemas.microsoft.com/office/powerpoint/2010/main" val="2248352843"/>
+        <p14:creationId xmlns:p14="http://schemas.microsoft.com/office/powerpoint/2010/main" val="2430739966"/>
       </p:ext>
     </p:extLst>
   </p:cSld>

</xml_diff>